<commit_message>
Deploying to gh-pages from @ rolitoxdd/eddya-2024-02@ed4c71e8017c63f028525ccc3f38c483bc3f6261 🚀
</commit_message>
<xml_diff>
--- a/05.pptx
+++ b/05.pptx
@@ -21,9 +21,10 @@
     <p:sldId id="269" r:id="rId15"/>
     <p:sldId id="270" r:id="rId16"/>
     <p:sldId id="271" r:id="rId17"/>
+    <p:sldId id="272" r:id="rId18"/>
   </p:sldIdLst>
   <p:notesMasterIdLst>
-    <p:notesMasterId r:id="rId18"/>
+    <p:notesMasterId r:id="rId19"/>
   </p:notesMasterIdLst>
   <p:sldSz cx="12192000" cy="6858000"/>
   <p:notesSz cx="6858000" cy="12192000"/>
@@ -1157,6 +1158,94 @@
             <a:fld id="{F7021451-1387-4CA6-816F-3879F97B5CBC}" type="slidenum">
               <a:rPr lang="en-US"/>
               <a:t>16</a:t>
+            </a:fld>
+            <a:endParaRPr lang="en-US"/>
+          </a:p>
+        </p:txBody>
+      </p:sp>
+    </p:spTree>
+    <p:extLst>
+      <p:ext uri="{BB962C8B-B14F-4D97-AF65-F5344CB8AC3E}">
+        <p14:creationId xmlns:p14="http://schemas.microsoft.com/office/powerpoint/2010/main" val="1024086991"/>
+      </p:ext>
+    </p:extLst>
+  </p:cSld>
+  <p:clrMapOvr>
+    <a:masterClrMapping/>
+  </p:clrMapOvr>
+</p:notes>
+</file>
+
+<file path=ppt/notesSlides/notesSlide17.xml><?xml version="1.0" encoding="utf-8"?>
+<p:notes xmlns:a="http://schemas.openxmlformats.org/drawingml/2006/main" xmlns:r="http://schemas.openxmlformats.org/officeDocument/2006/relationships" xmlns:p="http://schemas.openxmlformats.org/presentationml/2006/main">
+  <p:cSld>
+    <p:spTree>
+      <p:nvGrpSpPr>
+        <p:cNvPr id="1" name=""/>
+        <p:cNvGrpSpPr/>
+        <p:nvPr/>
+      </p:nvGrpSpPr>
+      <p:grpSpPr>
+        <a:xfrm>
+          <a:off x="0" y="0"/>
+          <a:ext cx="0" cy="0"/>
+          <a:chOff x="0" y="0"/>
+          <a:chExt cx="0" cy="0"/>
+        </a:xfrm>
+      </p:grpSpPr>
+      <p:sp>
+        <p:nvSpPr>
+          <p:cNvPr id="2" name="Slide Image Placeholder 1"/>
+          <p:cNvSpPr>
+            <a:spLocks noGrp="1" noRot="1" noChangeAspect="1"/>
+          </p:cNvSpPr>
+          <p:nvPr>
+            <p:ph type="sldImg"/>
+          </p:nvPr>
+        </p:nvSpPr>
+        <p:spPr/>
+      </p:sp>
+      <p:sp>
+        <p:nvSpPr>
+          <p:cNvPr id="3" name="Notes Placeholder 2"/>
+          <p:cNvSpPr>
+            <a:spLocks noGrp="1"/>
+          </p:cNvSpPr>
+          <p:nvPr>
+            <p:ph type="body" idx="1"/>
+          </p:nvPr>
+        </p:nvSpPr>
+        <p:spPr/>
+        <p:txBody>
+          <a:bodyPr/>
+          <a:lstStyle/>
+          <a:p>
+            <a:r>
+              <a:rPr lang="en-US" dirty="0"/>
+              <a:t/>
+            </a:r>
+            <a:endParaRPr lang="en-US" dirty="0"/>
+          </a:p>
+        </p:txBody>
+      </p:sp>
+      <p:sp>
+        <p:nvSpPr>
+          <p:cNvPr id="4" name="Slide Number Placeholder 3"/>
+          <p:cNvSpPr>
+            <a:spLocks noGrp="1"/>
+          </p:cNvSpPr>
+          <p:nvPr>
+            <p:ph type="sldNum" sz="quarter" idx="10"/>
+          </p:nvPr>
+        </p:nvSpPr>
+        <p:spPr/>
+        <p:txBody>
+          <a:bodyPr/>
+          <a:lstStyle/>
+          <a:p>
+            <a:fld id="{F7021451-1387-4CA6-816F-3879F97B5CBC}" type="slidenum">
+              <a:rPr lang="en-US"/>
+              <a:t>17</a:t>
             </a:fld>
             <a:endParaRPr lang="en-US"/>
           </a:p>
@@ -2462,6 +2551,45 @@
 <file path=ppt/slides/slide16.xml><?xml version="1.0" encoding="utf-8"?>
 <p:sld xmlns:a="http://schemas.openxmlformats.org/drawingml/2006/main" xmlns:r="http://schemas.openxmlformats.org/officeDocument/2006/relationships" xmlns:p="http://schemas.openxmlformats.org/presentationml/2006/main">
   <p:cSld name="Slide 16">
+    <p:bg>
+      <p:bgPr>
+        <a:blipFill dpi="0" rotWithShape="1">
+          <a:blip r:embed="rId1">
+            <a:lum/>
+          </a:blip>
+          <a:srcRect/>
+          <a:stretch>
+            <a:fillRect/>
+          </a:stretch>
+        </a:blipFill>
+        <a:effectLst/>
+      </p:bgPr>
+    </p:bg>
+    <p:spTree>
+      <p:nvGrpSpPr>
+        <p:cNvPr id="1" name=""/>
+        <p:cNvGrpSpPr/>
+        <p:nvPr/>
+      </p:nvGrpSpPr>
+      <p:grpSpPr>
+        <a:xfrm>
+          <a:off x="0" y="0"/>
+          <a:ext cx="0" cy="0"/>
+          <a:chOff x="0" y="0"/>
+          <a:chExt cx="0" cy="0"/>
+        </a:xfrm>
+      </p:grpSpPr>
+    </p:spTree>
+  </p:cSld>
+  <p:clrMapOvr>
+    <a:masterClrMapping/>
+  </p:clrMapOvr>
+</p:sld>
+</file>
+
+<file path=ppt/slides/slide17.xml><?xml version="1.0" encoding="utf-8"?>
+<p:sld xmlns:a="http://schemas.openxmlformats.org/drawingml/2006/main" xmlns:r="http://schemas.openxmlformats.org/officeDocument/2006/relationships" xmlns:p="http://schemas.openxmlformats.org/presentationml/2006/main">
+  <p:cSld name="Slide 17">
     <p:bg>
       <p:bgPr>
         <a:blipFill dpi="0" rotWithShape="1">

</xml_diff>